<commit_message>
Added this week (2nd week) plan
</commit_message>
<xml_diff>
--- a/SecondWeek-Presentation.pptx
+++ b/SecondWeek-Presentation.pptx
@@ -9,6 +9,11 @@
     <p:sldId id="260" r:id="rId3"/>
     <p:sldId id="257" r:id="rId4"/>
     <p:sldId id="258" r:id="rId5"/>
+    <p:sldId id="265" r:id="rId6"/>
+    <p:sldId id="261" r:id="rId7"/>
+    <p:sldId id="262" r:id="rId8"/>
+    <p:sldId id="263" r:id="rId9"/>
+    <p:sldId id="264" r:id="rId10"/>
   </p:sldIdLst>
   <p:sldSz cx="12192000" cy="6858000"/>
   <p:notesSz cx="6858000" cy="9144000"/>
@@ -8420,6 +8425,463 @@
 </p:sld>
 </file>
 
+<file path=ppt/slides/slide5.xml><?xml version="1.0" encoding="utf-8"?>
+<p:sld xmlns:a="http://schemas.openxmlformats.org/drawingml/2006/main" xmlns:r="http://schemas.openxmlformats.org/officeDocument/2006/relationships" xmlns:p="http://schemas.openxmlformats.org/presentationml/2006/main">
+  <p:cSld>
+    <p:spTree>
+      <p:nvGrpSpPr>
+        <p:cNvPr id="1" name=""/>
+        <p:cNvGrpSpPr/>
+        <p:nvPr/>
+      </p:nvGrpSpPr>
+      <p:grpSpPr>
+        <a:xfrm>
+          <a:off x="0" y="0"/>
+          <a:ext cx="0" cy="0"/>
+          <a:chOff x="0" y="0"/>
+          <a:chExt cx="0" cy="0"/>
+        </a:xfrm>
+      </p:grpSpPr>
+      <p:sp>
+        <p:nvSpPr>
+          <p:cNvPr id="2" name="Title 1">
+            <a:extLst>
+              <a:ext uri="{FF2B5EF4-FFF2-40B4-BE49-F238E27FC236}">
+                <a16:creationId xmlns:a16="http://schemas.microsoft.com/office/drawing/2014/main" id="{C90F0509-ABBF-4840-A769-E707D6107DC2}"/>
+              </a:ext>
+            </a:extLst>
+          </p:cNvPr>
+          <p:cNvSpPr>
+            <a:spLocks noGrp="1"/>
+          </p:cNvSpPr>
+          <p:nvPr>
+            <p:ph type="title"/>
+          </p:nvPr>
+        </p:nvSpPr>
+        <p:spPr/>
+        <p:txBody>
+          <a:bodyPr/>
+          <a:lstStyle/>
+          <a:p>
+            <a:r>
+              <a:rPr lang="en-US" dirty="0"/>
+              <a:t>This week plan</a:t>
+            </a:r>
+          </a:p>
+        </p:txBody>
+      </p:sp>
+      <p:sp>
+        <p:nvSpPr>
+          <p:cNvPr id="3" name="Content Placeholder 2">
+            <a:extLst>
+              <a:ext uri="{FF2B5EF4-FFF2-40B4-BE49-F238E27FC236}">
+                <a16:creationId xmlns:a16="http://schemas.microsoft.com/office/drawing/2014/main" id="{BDE018D0-CD08-4A15-B0EE-07C2F090E28C}"/>
+              </a:ext>
+            </a:extLst>
+          </p:cNvPr>
+          <p:cNvSpPr>
+            <a:spLocks noGrp="1"/>
+          </p:cNvSpPr>
+          <p:nvPr>
+            <p:ph idx="1"/>
+          </p:nvPr>
+        </p:nvSpPr>
+        <p:spPr/>
+        <p:txBody>
+          <a:bodyPr/>
+          <a:lstStyle/>
+          <a:p>
+            <a:r>
+              <a:rPr lang="en-US" dirty="0"/>
+              <a:t>Each team member is assigned to one task.</a:t>
+            </a:r>
+          </a:p>
+          <a:p>
+            <a:r>
+              <a:rPr lang="en-US" dirty="0"/>
+              <a:t>Continue taking items from the product backlog after finishing a task.</a:t>
+            </a:r>
+          </a:p>
+        </p:txBody>
+      </p:sp>
+    </p:spTree>
+    <p:extLst>
+      <p:ext uri="{BB962C8B-B14F-4D97-AF65-F5344CB8AC3E}">
+        <p14:creationId xmlns:p14="http://schemas.microsoft.com/office/powerpoint/2010/main" val="2460300087"/>
+      </p:ext>
+    </p:extLst>
+  </p:cSld>
+  <p:clrMapOvr>
+    <a:masterClrMapping/>
+  </p:clrMapOvr>
+</p:sld>
+</file>
+
+<file path=ppt/slides/slide6.xml><?xml version="1.0" encoding="utf-8"?>
+<p:sld xmlns:a="http://schemas.openxmlformats.org/drawingml/2006/main" xmlns:r="http://schemas.openxmlformats.org/officeDocument/2006/relationships" xmlns:p="http://schemas.openxmlformats.org/presentationml/2006/main">
+  <p:cSld>
+    <p:spTree>
+      <p:nvGrpSpPr>
+        <p:cNvPr id="1" name=""/>
+        <p:cNvGrpSpPr/>
+        <p:nvPr/>
+      </p:nvGrpSpPr>
+      <p:grpSpPr>
+        <a:xfrm>
+          <a:off x="0" y="0"/>
+          <a:ext cx="0" cy="0"/>
+          <a:chOff x="0" y="0"/>
+          <a:chExt cx="0" cy="0"/>
+        </a:xfrm>
+      </p:grpSpPr>
+      <p:sp>
+        <p:nvSpPr>
+          <p:cNvPr id="2" name="Title 1">
+            <a:extLst>
+              <a:ext uri="{FF2B5EF4-FFF2-40B4-BE49-F238E27FC236}">
+                <a16:creationId xmlns:a16="http://schemas.microsoft.com/office/drawing/2014/main" id="{19F4FF33-CC58-4F4C-B0C1-36A16FD8DAF0}"/>
+              </a:ext>
+            </a:extLst>
+          </p:cNvPr>
+          <p:cNvSpPr>
+            <a:spLocks noGrp="1"/>
+          </p:cNvSpPr>
+          <p:nvPr>
+            <p:ph type="title"/>
+          </p:nvPr>
+        </p:nvSpPr>
+        <p:spPr/>
+        <p:txBody>
+          <a:bodyPr/>
+          <a:lstStyle/>
+          <a:p>
+            <a:r>
+              <a:rPr lang="en-US" dirty="0"/>
+              <a:t>This week plan – Setting up Apache server</a:t>
+            </a:r>
+          </a:p>
+        </p:txBody>
+      </p:sp>
+      <p:pic>
+        <p:nvPicPr>
+          <p:cNvPr id="4" name="Content Placeholder 3">
+            <a:extLst>
+              <a:ext uri="{FF2B5EF4-FFF2-40B4-BE49-F238E27FC236}">
+                <a16:creationId xmlns:a16="http://schemas.microsoft.com/office/drawing/2014/main" id="{07F13EB8-165C-4DBD-881F-72E44172C619}"/>
+              </a:ext>
+            </a:extLst>
+          </p:cNvPr>
+          <p:cNvPicPr>
+            <a:picLocks noGrp="1" noChangeAspect="1"/>
+          </p:cNvPicPr>
+          <p:nvPr>
+            <p:ph idx="1"/>
+          </p:nvPr>
+        </p:nvPicPr>
+        <p:blipFill>
+          <a:blip r:embed="rId2"/>
+          <a:stretch>
+            <a:fillRect/>
+          </a:stretch>
+        </p:blipFill>
+        <p:spPr>
+          <a:xfrm>
+            <a:off x="1257640" y="1825625"/>
+            <a:ext cx="9676720" cy="4351338"/>
+          </a:xfrm>
+          <a:prstGeom prst="rect">
+            <a:avLst/>
+          </a:prstGeom>
+        </p:spPr>
+      </p:pic>
+    </p:spTree>
+    <p:extLst>
+      <p:ext uri="{BB962C8B-B14F-4D97-AF65-F5344CB8AC3E}">
+        <p14:creationId xmlns:p14="http://schemas.microsoft.com/office/powerpoint/2010/main" val="1315860533"/>
+      </p:ext>
+    </p:extLst>
+  </p:cSld>
+  <p:clrMapOvr>
+    <a:masterClrMapping/>
+  </p:clrMapOvr>
+</p:sld>
+</file>
+
+<file path=ppt/slides/slide7.xml><?xml version="1.0" encoding="utf-8"?>
+<p:sld xmlns:a="http://schemas.openxmlformats.org/drawingml/2006/main" xmlns:r="http://schemas.openxmlformats.org/officeDocument/2006/relationships" xmlns:p="http://schemas.openxmlformats.org/presentationml/2006/main">
+  <p:cSld>
+    <p:spTree>
+      <p:nvGrpSpPr>
+        <p:cNvPr id="1" name=""/>
+        <p:cNvGrpSpPr/>
+        <p:nvPr/>
+      </p:nvGrpSpPr>
+      <p:grpSpPr>
+        <a:xfrm>
+          <a:off x="0" y="0"/>
+          <a:ext cx="0" cy="0"/>
+          <a:chOff x="0" y="0"/>
+          <a:chExt cx="0" cy="0"/>
+        </a:xfrm>
+      </p:grpSpPr>
+      <p:sp>
+        <p:nvSpPr>
+          <p:cNvPr id="2" name="Title 1">
+            <a:extLst>
+              <a:ext uri="{FF2B5EF4-FFF2-40B4-BE49-F238E27FC236}">
+                <a16:creationId xmlns:a16="http://schemas.microsoft.com/office/drawing/2014/main" id="{4154DF2F-28ED-4324-B322-608B14396D31}"/>
+              </a:ext>
+            </a:extLst>
+          </p:cNvPr>
+          <p:cNvSpPr>
+            <a:spLocks noGrp="1"/>
+          </p:cNvSpPr>
+          <p:nvPr>
+            <p:ph type="title"/>
+          </p:nvPr>
+        </p:nvSpPr>
+        <p:spPr/>
+        <p:txBody>
+          <a:bodyPr/>
+          <a:lstStyle/>
+          <a:p>
+            <a:r>
+              <a:rPr lang="en-US" dirty="0"/>
+              <a:t>This week plan – Research on how to read Apache log</a:t>
+            </a:r>
+          </a:p>
+        </p:txBody>
+      </p:sp>
+      <p:pic>
+        <p:nvPicPr>
+          <p:cNvPr id="4" name="Content Placeholder 3">
+            <a:extLst>
+              <a:ext uri="{FF2B5EF4-FFF2-40B4-BE49-F238E27FC236}">
+                <a16:creationId xmlns:a16="http://schemas.microsoft.com/office/drawing/2014/main" id="{A1EFBCE4-E551-451B-9375-9D13AF0DBA1F}"/>
+              </a:ext>
+            </a:extLst>
+          </p:cNvPr>
+          <p:cNvPicPr>
+            <a:picLocks noGrp="1" noChangeAspect="1"/>
+          </p:cNvPicPr>
+          <p:nvPr>
+            <p:ph idx="1"/>
+          </p:nvPr>
+        </p:nvPicPr>
+        <p:blipFill>
+          <a:blip r:embed="rId2"/>
+          <a:stretch>
+            <a:fillRect/>
+          </a:stretch>
+        </p:blipFill>
+        <p:spPr>
+          <a:xfrm>
+            <a:off x="1524067" y="1825625"/>
+            <a:ext cx="9143865" cy="4351338"/>
+          </a:xfrm>
+          <a:prstGeom prst="rect">
+            <a:avLst/>
+          </a:prstGeom>
+        </p:spPr>
+      </p:pic>
+    </p:spTree>
+    <p:extLst>
+      <p:ext uri="{BB962C8B-B14F-4D97-AF65-F5344CB8AC3E}">
+        <p14:creationId xmlns:p14="http://schemas.microsoft.com/office/powerpoint/2010/main" val="2530740498"/>
+      </p:ext>
+    </p:extLst>
+  </p:cSld>
+  <p:clrMapOvr>
+    <a:masterClrMapping/>
+  </p:clrMapOvr>
+</p:sld>
+</file>
+
+<file path=ppt/slides/slide8.xml><?xml version="1.0" encoding="utf-8"?>
+<p:sld xmlns:a="http://schemas.openxmlformats.org/drawingml/2006/main" xmlns:r="http://schemas.openxmlformats.org/officeDocument/2006/relationships" xmlns:p="http://schemas.openxmlformats.org/presentationml/2006/main">
+  <p:cSld>
+    <p:spTree>
+      <p:nvGrpSpPr>
+        <p:cNvPr id="1" name=""/>
+        <p:cNvGrpSpPr/>
+        <p:nvPr/>
+      </p:nvGrpSpPr>
+      <p:grpSpPr>
+        <a:xfrm>
+          <a:off x="0" y="0"/>
+          <a:ext cx="0" cy="0"/>
+          <a:chOff x="0" y="0"/>
+          <a:chExt cx="0" cy="0"/>
+        </a:xfrm>
+      </p:grpSpPr>
+      <p:sp>
+        <p:nvSpPr>
+          <p:cNvPr id="2" name="Title 1">
+            <a:extLst>
+              <a:ext uri="{FF2B5EF4-FFF2-40B4-BE49-F238E27FC236}">
+                <a16:creationId xmlns:a16="http://schemas.microsoft.com/office/drawing/2014/main" id="{A365076D-8F61-4CF9-8953-DDFF3E2BE6EB}"/>
+              </a:ext>
+            </a:extLst>
+          </p:cNvPr>
+          <p:cNvSpPr>
+            <a:spLocks noGrp="1"/>
+          </p:cNvSpPr>
+          <p:nvPr>
+            <p:ph type="title"/>
+          </p:nvPr>
+        </p:nvSpPr>
+        <p:spPr/>
+        <p:txBody>
+          <a:bodyPr/>
+          <a:lstStyle/>
+          <a:p>
+            <a:r>
+              <a:rPr lang="en-US" dirty="0"/>
+              <a:t>This week plan – Research on how to use Pcap4J</a:t>
+            </a:r>
+          </a:p>
+        </p:txBody>
+      </p:sp>
+      <p:pic>
+        <p:nvPicPr>
+          <p:cNvPr id="4" name="Content Placeholder 3">
+            <a:extLst>
+              <a:ext uri="{FF2B5EF4-FFF2-40B4-BE49-F238E27FC236}">
+                <a16:creationId xmlns:a16="http://schemas.microsoft.com/office/drawing/2014/main" id="{68952B44-F93A-4B64-BF8C-C8DC789A30F1}"/>
+              </a:ext>
+            </a:extLst>
+          </p:cNvPr>
+          <p:cNvPicPr>
+            <a:picLocks noGrp="1" noChangeAspect="1"/>
+          </p:cNvPicPr>
+          <p:nvPr>
+            <p:ph idx="1"/>
+          </p:nvPr>
+        </p:nvPicPr>
+        <p:blipFill>
+          <a:blip r:embed="rId2"/>
+          <a:stretch>
+            <a:fillRect/>
+          </a:stretch>
+        </p:blipFill>
+        <p:spPr>
+          <a:xfrm>
+            <a:off x="1289501" y="1825625"/>
+            <a:ext cx="9612997" cy="4351338"/>
+          </a:xfrm>
+          <a:prstGeom prst="rect">
+            <a:avLst/>
+          </a:prstGeom>
+        </p:spPr>
+      </p:pic>
+    </p:spTree>
+    <p:extLst>
+      <p:ext uri="{BB962C8B-B14F-4D97-AF65-F5344CB8AC3E}">
+        <p14:creationId xmlns:p14="http://schemas.microsoft.com/office/powerpoint/2010/main" val="1925543219"/>
+      </p:ext>
+    </p:extLst>
+  </p:cSld>
+  <p:clrMapOvr>
+    <a:masterClrMapping/>
+  </p:clrMapOvr>
+</p:sld>
+</file>
+
+<file path=ppt/slides/slide9.xml><?xml version="1.0" encoding="utf-8"?>
+<p:sld xmlns:a="http://schemas.openxmlformats.org/drawingml/2006/main" xmlns:r="http://schemas.openxmlformats.org/officeDocument/2006/relationships" xmlns:p="http://schemas.openxmlformats.org/presentationml/2006/main">
+  <p:cSld>
+    <p:spTree>
+      <p:nvGrpSpPr>
+        <p:cNvPr id="1" name=""/>
+        <p:cNvGrpSpPr/>
+        <p:nvPr/>
+      </p:nvGrpSpPr>
+      <p:grpSpPr>
+        <a:xfrm>
+          <a:off x="0" y="0"/>
+          <a:ext cx="0" cy="0"/>
+          <a:chOff x="0" y="0"/>
+          <a:chExt cx="0" cy="0"/>
+        </a:xfrm>
+      </p:grpSpPr>
+      <p:sp>
+        <p:nvSpPr>
+          <p:cNvPr id="2" name="Title 1">
+            <a:extLst>
+              <a:ext uri="{FF2B5EF4-FFF2-40B4-BE49-F238E27FC236}">
+                <a16:creationId xmlns:a16="http://schemas.microsoft.com/office/drawing/2014/main" id="{9BB25E1A-531D-416F-8A9B-B5687B32A6B4}"/>
+              </a:ext>
+            </a:extLst>
+          </p:cNvPr>
+          <p:cNvSpPr>
+            <a:spLocks noGrp="1"/>
+          </p:cNvSpPr>
+          <p:nvPr>
+            <p:ph type="title"/>
+          </p:nvPr>
+        </p:nvSpPr>
+        <p:spPr/>
+        <p:txBody>
+          <a:bodyPr/>
+          <a:lstStyle/>
+          <a:p>
+            <a:r>
+              <a:rPr lang="en-US" dirty="0"/>
+              <a:t>This week plan – Detect </a:t>
+            </a:r>
+            <a:r>
+              <a:rPr lang="en-US" dirty="0" err="1"/>
+              <a:t>VerticalPortScanEvent</a:t>
+            </a:r>
+            <a:endParaRPr lang="en-US" dirty="0"/>
+          </a:p>
+        </p:txBody>
+      </p:sp>
+      <p:pic>
+        <p:nvPicPr>
+          <p:cNvPr id="4" name="Content Placeholder 3">
+            <a:extLst>
+              <a:ext uri="{FF2B5EF4-FFF2-40B4-BE49-F238E27FC236}">
+                <a16:creationId xmlns:a16="http://schemas.microsoft.com/office/drawing/2014/main" id="{4815BCA4-68BD-4208-9778-53DF8C5577C5}"/>
+              </a:ext>
+            </a:extLst>
+          </p:cNvPr>
+          <p:cNvPicPr>
+            <a:picLocks noGrp="1" noChangeAspect="1"/>
+          </p:cNvPicPr>
+          <p:nvPr>
+            <p:ph idx="1"/>
+          </p:nvPr>
+        </p:nvPicPr>
+        <p:blipFill>
+          <a:blip r:embed="rId2"/>
+          <a:stretch>
+            <a:fillRect/>
+          </a:stretch>
+        </p:blipFill>
+        <p:spPr>
+          <a:xfrm>
+            <a:off x="1156391" y="1825625"/>
+            <a:ext cx="9879218" cy="4351338"/>
+          </a:xfrm>
+          <a:prstGeom prst="rect">
+            <a:avLst/>
+          </a:prstGeom>
+        </p:spPr>
+      </p:pic>
+    </p:spTree>
+    <p:extLst>
+      <p:ext uri="{BB962C8B-B14F-4D97-AF65-F5344CB8AC3E}">
+        <p14:creationId xmlns:p14="http://schemas.microsoft.com/office/powerpoint/2010/main" val="1165312526"/>
+      </p:ext>
+    </p:extLst>
+  </p:cSld>
+  <p:clrMapOvr>
+    <a:masterClrMapping/>
+  </p:clrMapOvr>
+</p:sld>
+</file>
+
 <file path=ppt/theme/theme1.xml><?xml version="1.0" encoding="utf-8"?>
 <a:theme xmlns:a="http://schemas.openxmlformats.org/drawingml/2006/main" name="Office Theme">
   <a:themeElements>

</xml_diff>